<commit_message>
Demo: added new presentations
</commit_message>
<xml_diff>
--- a/Demonstrator/Presentations/16_09_26_LAr_week_Dresden.pptx
+++ b/Demonstrator/Presentations/16_09_26_LAr_week_Dresden.pptx
@@ -221,7 +221,7 @@
           <a:p>
             <a:fld id="{7B811F31-5248-445B-B152-02829630F421}" type="datetimeFigureOut">
               <a:rPr lang="it-IT" smtClean="0"/>
-              <a:t>23/09/2016</a:t>
+              <a:t>04/10/2016</a:t>
             </a:fld>
             <a:endParaRPr lang="it-IT"/>
           </a:p>
@@ -2720,7 +2720,7 @@
           <a:p>
             <a:fld id="{48D9D455-ED90-492E-A654-9E8AF1C32BF3}" type="datetime1">
               <a:rPr lang="it-IT" smtClean="0"/>
-              <a:t>23/09/2016</a:t>
+              <a:t>04/10/2016</a:t>
             </a:fld>
             <a:endParaRPr lang="it-IT"/>
           </a:p>
@@ -2906,7 +2906,7 @@
           <a:p>
             <a:fld id="{D9E56605-DFC5-4E98-A86A-BE962CF63BDA}" type="datetime1">
               <a:rPr lang="it-IT" smtClean="0"/>
-              <a:t>23/09/2016</a:t>
+              <a:t>04/10/2016</a:t>
             </a:fld>
             <a:endParaRPr lang="it-IT"/>
           </a:p>
@@ -3086,7 +3086,7 @@
           <a:p>
             <a:fld id="{39B84713-7DCC-4AA9-891D-8BF0D94CA4BB}" type="datetime1">
               <a:rPr lang="it-IT" smtClean="0"/>
-              <a:t>23/09/2016</a:t>
+              <a:t>04/10/2016</a:t>
             </a:fld>
             <a:endParaRPr lang="it-IT"/>
           </a:p>
@@ -3256,7 +3256,7 @@
           <a:p>
             <a:fld id="{D4CDF580-8851-47A2-A37D-6170751891CD}" type="datetime1">
               <a:rPr lang="it-IT" smtClean="0"/>
-              <a:t>23/09/2016</a:t>
+              <a:t>04/10/2016</a:t>
             </a:fld>
             <a:endParaRPr lang="it-IT"/>
           </a:p>
@@ -3509,7 +3509,7 @@
           <a:p>
             <a:fld id="{E4DEEEFE-5B8A-4661-BF70-A4C25E9B1104}" type="datetime1">
               <a:rPr lang="it-IT" smtClean="0"/>
-              <a:t>23/09/2016</a:t>
+              <a:t>04/10/2016</a:t>
             </a:fld>
             <a:endParaRPr lang="it-IT"/>
           </a:p>
@@ -3748,7 +3748,7 @@
           <a:p>
             <a:fld id="{7C9B4E0E-4531-43F9-9DAC-B8476806B9B7}" type="datetime1">
               <a:rPr lang="it-IT" smtClean="0"/>
-              <a:t>23/09/2016</a:t>
+              <a:t>04/10/2016</a:t>
             </a:fld>
             <a:endParaRPr lang="it-IT"/>
           </a:p>
@@ -4122,7 +4122,7 @@
           <a:p>
             <a:fld id="{E432B9E2-EFDC-4239-A1FD-597E2A458078}" type="datetime1">
               <a:rPr lang="it-IT" smtClean="0"/>
-              <a:t>23/09/2016</a:t>
+              <a:t>04/10/2016</a:t>
             </a:fld>
             <a:endParaRPr lang="it-IT"/>
           </a:p>
@@ -4247,7 +4247,7 @@
           <a:p>
             <a:fld id="{55AB1887-700B-4775-B998-9605009EB319}" type="datetime1">
               <a:rPr lang="it-IT" smtClean="0"/>
-              <a:t>23/09/2016</a:t>
+              <a:t>04/10/2016</a:t>
             </a:fld>
             <a:endParaRPr lang="it-IT"/>
           </a:p>
@@ -4342,7 +4342,7 @@
           <a:p>
             <a:fld id="{9DA32D03-E684-45EA-B37F-126B43A2CDF8}" type="datetime1">
               <a:rPr lang="it-IT" smtClean="0"/>
-              <a:t>23/09/2016</a:t>
+              <a:t>04/10/2016</a:t>
             </a:fld>
             <a:endParaRPr lang="it-IT"/>
           </a:p>
@@ -4619,7 +4619,7 @@
           <a:p>
             <a:fld id="{DE4236A0-9435-4D1D-914E-753EC4440CE8}" type="datetime1">
               <a:rPr lang="it-IT" smtClean="0"/>
-              <a:t>23/09/2016</a:t>
+              <a:t>04/10/2016</a:t>
             </a:fld>
             <a:endParaRPr lang="it-IT"/>
           </a:p>
@@ -4872,7 +4872,7 @@
           <a:p>
             <a:fld id="{EDA85BC2-76C4-4B6D-9460-BF24F237096E}" type="datetime1">
               <a:rPr lang="it-IT" smtClean="0"/>
-              <a:t>23/09/2016</a:t>
+              <a:t>04/10/2016</a:t>
             </a:fld>
             <a:endParaRPr lang="it-IT"/>
           </a:p>
@@ -5088,7 +5088,7 @@
           <a:p>
             <a:fld id="{E43F963E-66F9-47C3-9103-3F9DB5678E50}" type="datetime1">
               <a:rPr lang="it-IT" smtClean="0"/>
-              <a:t>23/09/2016</a:t>
+              <a:t>04/10/2016</a:t>
             </a:fld>
             <a:endParaRPr lang="it-IT"/>
           </a:p>
@@ -6375,15 +6375,7 @@
             </a:r>
             <a:r>
               <a:rPr lang="en-US" sz="2200" b="1" dirty="0" smtClean="0"/>
-              <a:t>only </a:t>
-            </a:r>
-            <a:r>
-              <a:rPr lang="en-US" sz="2200" b="1" dirty="0" smtClean="0"/>
-              <a:t>5% </a:t>
-            </a:r>
-            <a:r>
-              <a:rPr lang="en-US" sz="2200" b="1" dirty="0" smtClean="0"/>
-              <a:t>(after 200 </a:t>
+              <a:t>only 5% (after 200 </a:t>
             </a:r>
             <a:r>
               <a:rPr lang="en-US" sz="2200" b="1" dirty="0"/>
@@ -6448,11 +6440,7 @@
             </a:pPr>
             <a:r>
               <a:rPr lang="en-US" sz="2200" dirty="0" smtClean="0"/>
-              <a:t>The aim was to have the pulse entirely </a:t>
-            </a:r>
-            <a:r>
-              <a:rPr lang="en-US" sz="2200" dirty="0" smtClean="0"/>
-              <a:t>in </a:t>
+              <a:t>The aim was to have the pulse entirely in </a:t>
             </a:r>
             <a:r>
               <a:rPr lang="en-US" sz="2200" dirty="0"/>
@@ -6797,23 +6785,7 @@
           <a:p>
             <a:r>
               <a:rPr lang="en-GB" dirty="0" smtClean="0"/>
-              <a:t>Some calibration runs, with different latency </a:t>
-            </a:r>
-            <a:r>
-              <a:rPr lang="en-GB" dirty="0" smtClean="0"/>
-              <a:t>settings</a:t>
-            </a:r>
-            <a:r>
-              <a:rPr lang="en-GB" dirty="0" smtClean="0"/>
-              <a:t>, have been taken in USA15 for </a:t>
-            </a:r>
-            <a:r>
-              <a:rPr lang="en-GB" dirty="0" smtClean="0"/>
-              <a:t>all four </a:t>
-            </a:r>
-            <a:r>
-              <a:rPr lang="en-GB" dirty="0" smtClean="0"/>
-              <a:t>FPGAs.</a:t>
+              <a:t>Some calibration runs, with different latency settings, have been taken in USA15 for all four FPGAs.</a:t>
             </a:r>
           </a:p>
           <a:p>
@@ -8044,11 +8016,7 @@
             </a:r>
             <a:r>
               <a:rPr lang="en-US" sz="2000" dirty="0" smtClean="0"/>
-              <a:t> all </a:t>
-            </a:r>
-            <a:r>
-              <a:rPr lang="en-US" sz="2000" dirty="0" smtClean="0"/>
-              <a:t>the details):  </a:t>
+              <a:t> all the details):  </a:t>
             </a:r>
             <a:endParaRPr lang="en-US" sz="2000" dirty="0"/>
           </a:p>
@@ -8635,11 +8603,7 @@
             </a:r>
             <a:r>
               <a:rPr lang="en-US" b="1" dirty="0" smtClean="0"/>
-              <a:t>L1A </a:t>
-            </a:r>
-            <a:r>
-              <a:rPr lang="en-US" b="1" dirty="0" smtClean="0"/>
-              <a:t>rate</a:t>
+              <a:t>L1A rate</a:t>
             </a:r>
             <a:r>
               <a:rPr lang="en-US" dirty="0" smtClean="0"/>
@@ -9019,15 +8983,7 @@
                       <a:pPr algn="ctr"/>
                       <a:r>
                         <a:rPr lang="en-US" dirty="0" smtClean="0"/>
-                        <a:t>93% </a:t>
-                      </a:r>
-                      <a:r>
-                        <a:rPr lang="en-US" dirty="0" smtClean="0"/>
-                        <a:t>- </a:t>
-                      </a:r>
-                      <a:r>
-                        <a:rPr lang="en-US" dirty="0" smtClean="0"/>
-                        <a:t>95%</a:t>
+                        <a:t>93% - 95%</a:t>
                       </a:r>
                       <a:endParaRPr lang="it-IT" dirty="0"/>
                     </a:p>
@@ -9137,15 +9093,7 @@
                       <a:pPr algn="ctr"/>
                       <a:r>
                         <a:rPr lang="en-US" dirty="0" smtClean="0"/>
-                        <a:t>30% </a:t>
-                      </a:r>
-                      <a:r>
-                        <a:rPr lang="en-US" dirty="0" smtClean="0"/>
-                        <a:t>- </a:t>
-                      </a:r>
-                      <a:r>
-                        <a:rPr lang="en-US" dirty="0" smtClean="0"/>
-                        <a:t>55%</a:t>
+                        <a:t>30% - 55%</a:t>
                       </a:r>
                       <a:endParaRPr lang="it-IT" dirty="0"/>
                     </a:p>
@@ -9680,15 +9628,7 @@
             </a:r>
             <a:r>
               <a:rPr lang="en-US" b="1" dirty="0" smtClean="0"/>
-              <a:t>trigger</a:t>
-            </a:r>
-            <a:r>
-              <a:rPr lang="en-US" b="1" dirty="0" smtClean="0"/>
-              <a:t> </a:t>
-            </a:r>
-            <a:r>
-              <a:rPr lang="en-US" b="1" dirty="0" smtClean="0"/>
-              <a:t>rate </a:t>
+              <a:t>trigger rate </a:t>
             </a:r>
             <a:r>
               <a:rPr lang="en-US" dirty="0" smtClean="0"/>
@@ -9974,11 +9914,7 @@
           <a:p>
             <a:r>
               <a:rPr lang="en-GB" sz="4000" dirty="0" smtClean="0"/>
-              <a:t>Calibration at different </a:t>
-            </a:r>
-            <a:r>
-              <a:rPr lang="en-GB" sz="4000" dirty="0" smtClean="0"/>
-              <a:t>trigger rates</a:t>
+              <a:t>Calibration at different trigger rates</a:t>
             </a:r>
             <a:endParaRPr lang="en-GB" sz="4000" dirty="0"/>
           </a:p>
@@ -10059,7 +9995,7 @@
             </a:r>
             <a:r>
               <a:rPr lang="it-IT" b="1" dirty="0" smtClean="0"/>
-              <a:t> HLT </a:t>
+              <a:t> trigger </a:t>
             </a:r>
             <a:r>
               <a:rPr lang="it-IT" b="1" dirty="0" err="1" smtClean="0"/>
@@ -10109,11 +10045,7 @@
             </a:r>
             <a:r>
               <a:rPr lang="en-US" dirty="0" smtClean="0"/>
-              <a:t>: 19:1 excluded. </a:t>
-            </a:r>
-            <a:r>
-              <a:rPr lang="en-US" dirty="0" smtClean="0"/>
-              <a:t>Again the total number of events is 3000.</a:t>
+              <a:t>: 19:1 excluded. Again the total number of events is 3000.</a:t>
             </a:r>
             <a:endParaRPr lang="it-IT" dirty="0" smtClean="0"/>
           </a:p>
@@ -10239,11 +10171,7 @@
                       </a:r>
                       <a:r>
                         <a:rPr lang="en-US" baseline="0" dirty="0" smtClean="0"/>
-                        <a:t>(Hz</a:t>
-                      </a:r>
-                      <a:r>
-                        <a:rPr lang="en-US" baseline="0" dirty="0" smtClean="0"/>
-                        <a:t>)</a:t>
+                        <a:t>(Hz)</a:t>
                       </a:r>
                       <a:endParaRPr lang="it-IT" dirty="0"/>
                     </a:p>
@@ -11968,7 +11896,7 @@
         <p:spPr>
           <a:xfrm>
             <a:off x="764638" y="5744507"/>
-            <a:ext cx="3942233" cy="369332"/>
+            <a:ext cx="4107343" cy="369332"/>
           </a:xfrm>
           <a:prstGeom prst="rect">
             <a:avLst/>
@@ -11982,7 +11910,15 @@
           <a:p>
             <a:r>
               <a:rPr lang="en-US" dirty="0"/>
-              <a:t>more than 50 events lost per each FPGA</a:t>
+              <a:t>more than </a:t>
+            </a:r>
+            <a:r>
+              <a:rPr lang="en-US" dirty="0" smtClean="0"/>
+              <a:t>50% </a:t>
+            </a:r>
+            <a:r>
+              <a:rPr lang="en-US" dirty="0"/>
+              <a:t>events lost per each FPGA</a:t>
             </a:r>
             <a:endParaRPr lang="it-IT" dirty="0"/>
           </a:p>
@@ -13005,15 +12941,7 @@
           <a:p>
             <a:r>
               <a:rPr lang="en-GB" sz="4000" dirty="0" smtClean="0"/>
-              <a:t>Conclusion and </a:t>
-            </a:r>
-            <a:r>
-              <a:rPr lang="en-GB" sz="4000" dirty="0" smtClean="0"/>
-              <a:t>outlook </a:t>
-            </a:r>
-            <a:r>
-              <a:rPr lang="en-GB" sz="4000" dirty="0" smtClean="0"/>
-              <a:t>(1) </a:t>
+              <a:t>Conclusion and outlook (1) </a:t>
             </a:r>
             <a:endParaRPr lang="en-GB" sz="4000" dirty="0"/>
           </a:p>
@@ -13180,11 +13108,7 @@
             </a:pPr>
             <a:r>
               <a:rPr lang="it-IT" sz="2000" dirty="0" smtClean="0"/>
-              <a:t>The </a:t>
-            </a:r>
-            <a:r>
-              <a:rPr lang="it-IT" sz="2000" dirty="0" smtClean="0"/>
-              <a:t>new </a:t>
+              <a:t>The new </a:t>
             </a:r>
             <a:r>
               <a:rPr lang="it-IT" sz="2000" dirty="0" err="1" smtClean="0"/>
@@ -13192,11 +13116,7 @@
             </a:r>
             <a:r>
               <a:rPr lang="it-IT" sz="2000" dirty="0" smtClean="0"/>
-              <a:t> </a:t>
-            </a:r>
-            <a:r>
-              <a:rPr lang="it-IT" sz="2000" dirty="0" smtClean="0"/>
-              <a:t>put in </a:t>
+              <a:t> put in </a:t>
             </a:r>
             <a:r>
               <a:rPr lang="it-IT" sz="2000" dirty="0" err="1" smtClean="0"/>
@@ -13472,7 +13392,6 @@
               <a:rPr lang="it-IT" sz="2000" dirty="0" smtClean="0"/>
               <a:t>.</a:t>
             </a:r>
-            <a:endParaRPr lang="it-IT" sz="2000" dirty="0" smtClean="0"/>
           </a:p>
           <a:p>
             <a:pPr marL="1257300" lvl="2" indent="-342900" algn="just">
@@ -13501,8 +13420,13 @@
             </a:r>
             <a:r>
               <a:rPr lang="it-IT" sz="2000" dirty="0" smtClean="0"/>
-              <a:t> the flash</a:t>
-            </a:r>
+              <a:t> the flash </a:t>
+            </a:r>
+            <a:r>
+              <a:rPr lang="it-IT" sz="2000" dirty="0" err="1" smtClean="0"/>
+              <a:t>memory</a:t>
+            </a:r>
+            <a:endParaRPr lang="it-IT" sz="2000" dirty="0" smtClean="0"/>
           </a:p>
           <a:p>
             <a:pPr marL="1257300" lvl="2" indent="-342900" algn="just">
@@ -14033,7 +13957,7 @@
             </a:pPr>
             <a:r>
               <a:rPr lang="it-IT" sz="2400" dirty="0" err="1" smtClean="0"/>
-              <a:t>Numer</a:t>
+              <a:t>Number</a:t>
             </a:r>
             <a:r>
               <a:rPr lang="it-IT" sz="2400" dirty="0" smtClean="0"/>
@@ -14088,11 +14012,7 @@
             </a:r>
             <a:r>
               <a:rPr lang="it-IT" sz="2400" dirty="0" smtClean="0"/>
-              <a:t> </a:t>
-            </a:r>
-            <a:r>
-              <a:rPr lang="it-IT" sz="2400" dirty="0" smtClean="0"/>
-              <a:t>of </a:t>
+              <a:t> of </a:t>
             </a:r>
             <a:r>
               <a:rPr lang="it-IT" sz="2400" dirty="0" err="1" smtClean="0"/>
@@ -14357,15 +14277,7 @@
           <a:p>
             <a:r>
               <a:rPr lang="en-GB" sz="4000" dirty="0" smtClean="0"/>
-              <a:t>Conclusion and </a:t>
-            </a:r>
-            <a:r>
-              <a:rPr lang="en-GB" sz="4000" dirty="0" smtClean="0"/>
-              <a:t>outlook </a:t>
-            </a:r>
-            <a:r>
-              <a:rPr lang="en-GB" sz="4000" dirty="0" smtClean="0"/>
-              <a:t>(2)</a:t>
+              <a:t>Conclusion and outlook (2)</a:t>
             </a:r>
             <a:endParaRPr lang="en-GB" sz="4000" dirty="0"/>
           </a:p>
@@ -14567,11 +14479,7 @@
             </a:r>
             <a:r>
               <a:rPr lang="it-IT" sz="2000" dirty="0" smtClean="0"/>
-              <a:t> in </a:t>
-            </a:r>
-            <a:r>
-              <a:rPr lang="it-IT" sz="2000" dirty="0" smtClean="0"/>
-              <a:t>the </a:t>
+              <a:t> in the </a:t>
             </a:r>
             <a:r>
               <a:rPr lang="it-IT" sz="2000" dirty="0" err="1" smtClean="0"/>
@@ -14662,19 +14570,7 @@
             </a:pPr>
             <a:r>
               <a:rPr lang="en-US" sz="2000" dirty="0" smtClean="0"/>
-              <a:t>The higher is the </a:t>
-            </a:r>
-            <a:r>
-              <a:rPr lang="en-US" sz="2000" dirty="0" smtClean="0"/>
-              <a:t>trigger rate</a:t>
-            </a:r>
-            <a:r>
-              <a:rPr lang="en-US" sz="2000" dirty="0" smtClean="0"/>
-              <a:t> </a:t>
-            </a:r>
-            <a:r>
-              <a:rPr lang="en-US" sz="2000" dirty="0" smtClean="0"/>
-              <a:t>the lower is number of events recorded</a:t>
+              <a:t>The higher is the trigger rate the lower is number of events recorded</a:t>
             </a:r>
           </a:p>
           <a:p>
@@ -15310,15 +15206,7 @@
           <a:p>
             <a:r>
               <a:rPr lang="en-GB" sz="4000" dirty="0" smtClean="0"/>
-              <a:t>Calibration at different </a:t>
-            </a:r>
-            <a:r>
-              <a:rPr lang="en-GB" sz="4000" dirty="0" smtClean="0"/>
-              <a:t>trigger rates </a:t>
-            </a:r>
-            <a:r>
-              <a:rPr lang="en-GB" sz="4000" dirty="0" smtClean="0"/>
-              <a:t>(part 1)</a:t>
+              <a:t>Calibration at different trigger rates (part 1)</a:t>
             </a:r>
             <a:endParaRPr lang="en-GB" sz="4000" dirty="0"/>
           </a:p>
@@ -15391,15 +15279,7 @@
             </a:r>
             <a:r>
               <a:rPr lang="it-IT" dirty="0" smtClean="0"/>
-              <a:t> the </a:t>
-            </a:r>
-            <a:r>
-              <a:rPr lang="it-IT" dirty="0" smtClean="0"/>
-              <a:t>trigger rate </a:t>
-            </a:r>
-            <a:r>
-              <a:rPr lang="it-IT" dirty="0" smtClean="0"/>
-              <a:t>and the </a:t>
+              <a:t> the trigger rate and the </a:t>
             </a:r>
             <a:r>
               <a:rPr lang="it-IT" dirty="0" err="1" smtClean="0"/>
@@ -15852,15 +15732,7 @@
           <a:p>
             <a:r>
               <a:rPr lang="en-GB" sz="4000" dirty="0" smtClean="0"/>
-              <a:t>Calibration at different </a:t>
-            </a:r>
-            <a:r>
-              <a:rPr lang="en-GB" sz="4000" dirty="0" smtClean="0"/>
-              <a:t>trigger rates </a:t>
-            </a:r>
-            <a:r>
-              <a:rPr lang="en-GB" sz="4000" dirty="0" smtClean="0"/>
-              <a:t>(part 2)</a:t>
+              <a:t>Calibration at different trigger rates (part 2)</a:t>
             </a:r>
             <a:endParaRPr lang="en-GB" sz="4000" dirty="0"/>
           </a:p>
@@ -16314,15 +16186,7 @@
           <a:p>
             <a:r>
               <a:rPr lang="en-GB" sz="4000" dirty="0" smtClean="0"/>
-              <a:t>Calibration at different </a:t>
-            </a:r>
-            <a:r>
-              <a:rPr lang="en-GB" sz="4000" dirty="0" smtClean="0"/>
-              <a:t>trigger rates </a:t>
-            </a:r>
-            <a:r>
-              <a:rPr lang="en-GB" sz="4000" dirty="0" smtClean="0"/>
-              <a:t>(part 3)</a:t>
+              <a:t>Calibration at different trigger rates (part 3)</a:t>
             </a:r>
             <a:endParaRPr lang="en-GB" sz="4000" dirty="0"/>
           </a:p>
@@ -17626,8 +17490,12 @@
               <a:t> are now available to reset different </a:t>
             </a:r>
             <a:r>
+              <a:rPr lang="en-US" b="1" dirty="0" smtClean="0"/>
+              <a:t>interfaces</a:t>
+            </a:r>
+            <a:r>
               <a:rPr lang="en-US" dirty="0" smtClean="0"/>
-              <a:t>interfaces </a:t>
+              <a:t> </a:t>
             </a:r>
             <a:r>
               <a:rPr lang="en-US" dirty="0"/>
@@ -17781,15 +17649,7 @@
             </a:r>
             <a:r>
               <a:rPr lang="en-US" dirty="0" smtClean="0"/>
-              <a:t>(thanks to Philipp!). No </a:t>
-            </a:r>
-            <a:r>
-              <a:rPr lang="en-US" dirty="0" smtClean="0"/>
-              <a:t>changes </a:t>
-            </a:r>
-            <a:r>
-              <a:rPr lang="en-US" dirty="0" smtClean="0"/>
-              <a:t>in the firmware functionality, so not yet used in USA15.</a:t>
+              <a:t>(thanks to Philipp!). No changes in the firmware functionality, so not yet used in USA15.</a:t>
             </a:r>
             <a:endParaRPr lang="it-IT" dirty="0" smtClean="0"/>
           </a:p>
@@ -18443,6 +18303,35 @@
           </a:fontRef>
         </p:style>
       </p:cxnSp>
+      <p:pic>
+        <p:nvPicPr>
+          <p:cNvPr id="7" name="Immagine 6"/>
+          <p:cNvPicPr>
+            <a:picLocks noChangeAspect="1"/>
+          </p:cNvPicPr>
+          <p:nvPr/>
+        </p:nvPicPr>
+        <p:blipFill rotWithShape="1">
+          <a:blip r:embed="rId3" cstate="print">
+            <a:extLst>
+              <a:ext uri="{28A0092B-C50C-407E-A947-70E740481C1C}">
+                <a14:useLocalDpi xmlns:a14="http://schemas.microsoft.com/office/drawing/2010/main" val="0"/>
+              </a:ext>
+            </a:extLst>
+          </a:blip>
+          <a:srcRect r="7829"/>
+          <a:stretch/>
+        </p:blipFill>
+        <p:spPr>
+          <a:xfrm>
+            <a:off x="6816338" y="2862935"/>
+            <a:ext cx="5302872" cy="2937753"/>
+          </a:xfrm>
+          <a:prstGeom prst="rect">
+            <a:avLst/>
+          </a:prstGeom>
+        </p:spPr>
+      </p:pic>
       <p:sp>
         <p:nvSpPr>
           <p:cNvPr id="9" name="CasellaDiTesto 8"/>
@@ -18753,19 +18642,11 @@
             </a:r>
             <a:r>
               <a:rPr lang="en-US" b="1" dirty="0" smtClean="0"/>
-              <a:t>ABBA </a:t>
-            </a:r>
-            <a:r>
-              <a:rPr lang="en-US" b="1" dirty="0" smtClean="0"/>
-              <a:t>package </a:t>
+              <a:t>ABBA package </a:t>
             </a:r>
             <a:r>
               <a:rPr lang="en-US" dirty="0" smtClean="0"/>
-              <a:t>at </a:t>
-            </a:r>
-            <a:r>
-              <a:rPr lang="en-US" dirty="0" smtClean="0"/>
-              <a:t>CONFIG and START level.</a:t>
+              <a:t>at CONFIG and START level.</a:t>
             </a:r>
           </a:p>
         </p:txBody>
@@ -18808,35 +18689,6 @@
           </a:p>
         </p:txBody>
       </p:sp>
-      <p:pic>
-        <p:nvPicPr>
-          <p:cNvPr id="2" name="Immagine 1"/>
-          <p:cNvPicPr>
-            <a:picLocks noChangeAspect="1"/>
-          </p:cNvPicPr>
-          <p:nvPr/>
-        </p:nvPicPr>
-        <p:blipFill rotWithShape="1">
-          <a:blip r:embed="rId3" cstate="print">
-            <a:extLst>
-              <a:ext uri="{28A0092B-C50C-407E-A947-70E740481C1C}">
-                <a14:useLocalDpi xmlns:a14="http://schemas.microsoft.com/office/drawing/2010/main" val="0"/>
-              </a:ext>
-            </a:extLst>
-          </a:blip>
-          <a:srcRect r="8551"/>
-          <a:stretch/>
-        </p:blipFill>
-        <p:spPr>
-          <a:xfrm>
-            <a:off x="6934654" y="2814282"/>
-            <a:ext cx="5225501" cy="2917780"/>
-          </a:xfrm>
-          <a:prstGeom prst="rect">
-            <a:avLst/>
-          </a:prstGeom>
-        </p:spPr>
-      </p:pic>
     </p:spTree>
     <p:extLst>
       <p:ext uri="{BB962C8B-B14F-4D97-AF65-F5344CB8AC3E}">
@@ -19884,7 +19736,7 @@
                     <a:lstStyle/>
                     <a:p>
                       <a:r>
-                        <a:rPr lang="it-IT" sz="1400">
+                        <a:rPr lang="it-IT" sz="1400" dirty="0">
                           <a:effectLst/>
                         </a:rPr>
                         <a:t>1</a:t>

</xml_diff>